<commit_message>
Sceicne pltform pu tin diagram
</commit_message>
<xml_diff>
--- a/DMsandwich.pptx
+++ b/DMsandwich.pptx
@@ -104,6 +104,22 @@
       </a:defRPr>
     </a:lvl9pPr>
   </p:defaultTextStyle>
+  <p:extLst>
+    <p:ext uri="{EFAFB233-063F-42B5-8137-9DF3F51BA10A}">
+      <p15:sldGuideLst xmlns:p15="http://schemas.microsoft.com/office/powerpoint/2012/main">
+        <p15:guide id="1" orient="horz" pos="1728">
+          <p15:clr>
+            <a:srgbClr val="A4A3A4"/>
+          </p15:clr>
+        </p15:guide>
+        <p15:guide id="2" pos="1728">
+          <p15:clr>
+            <a:srgbClr val="A4A3A4"/>
+          </p15:clr>
+        </p15:guide>
+      </p15:sldGuideLst>
+    </p:ext>
+  </p:extLst>
 </p:presentation>
 </file>
 
@@ -288,7 +304,7 @@
           <a:p>
             <a:fld id="{14627BBC-630D-C841-BF83-BB7F02310FA4}" type="datetimeFigureOut">
               <a:rPr lang="en-US" smtClean="0"/>
-              <a:t>8/7/14</a:t>
+              <a:t>11/22/17</a:t>
             </a:fld>
             <a:endParaRPr lang="en-US"/>
           </a:p>
@@ -458,7 +474,7 @@
           <a:p>
             <a:fld id="{14627BBC-630D-C841-BF83-BB7F02310FA4}" type="datetimeFigureOut">
               <a:rPr lang="en-US" smtClean="0"/>
-              <a:t>8/7/14</a:t>
+              <a:t>11/22/17</a:t>
             </a:fld>
             <a:endParaRPr lang="en-US"/>
           </a:p>
@@ -638,7 +654,7 @@
           <a:p>
             <a:fld id="{14627BBC-630D-C841-BF83-BB7F02310FA4}" type="datetimeFigureOut">
               <a:rPr lang="en-US" smtClean="0"/>
-              <a:t>8/7/14</a:t>
+              <a:t>11/22/17</a:t>
             </a:fld>
             <a:endParaRPr lang="en-US"/>
           </a:p>
@@ -808,7 +824,7 @@
           <a:p>
             <a:fld id="{14627BBC-630D-C841-BF83-BB7F02310FA4}" type="datetimeFigureOut">
               <a:rPr lang="en-US" smtClean="0"/>
-              <a:t>8/7/14</a:t>
+              <a:t>11/22/17</a:t>
             </a:fld>
             <a:endParaRPr lang="en-US"/>
           </a:p>
@@ -1054,7 +1070,7 @@
           <a:p>
             <a:fld id="{14627BBC-630D-C841-BF83-BB7F02310FA4}" type="datetimeFigureOut">
               <a:rPr lang="en-US" smtClean="0"/>
-              <a:t>8/7/14</a:t>
+              <a:t>11/22/17</a:t>
             </a:fld>
             <a:endParaRPr lang="en-US"/>
           </a:p>
@@ -1342,7 +1358,7 @@
           <a:p>
             <a:fld id="{14627BBC-630D-C841-BF83-BB7F02310FA4}" type="datetimeFigureOut">
               <a:rPr lang="en-US" smtClean="0"/>
-              <a:t>8/7/14</a:t>
+              <a:t>11/22/17</a:t>
             </a:fld>
             <a:endParaRPr lang="en-US"/>
           </a:p>
@@ -1769,7 +1785,7 @@
           <a:p>
             <a:fld id="{14627BBC-630D-C841-BF83-BB7F02310FA4}" type="datetimeFigureOut">
               <a:rPr lang="en-US" smtClean="0"/>
-              <a:t>8/7/14</a:t>
+              <a:t>11/22/17</a:t>
             </a:fld>
             <a:endParaRPr lang="en-US"/>
           </a:p>
@@ -1887,7 +1903,7 @@
           <a:p>
             <a:fld id="{14627BBC-630D-C841-BF83-BB7F02310FA4}" type="datetimeFigureOut">
               <a:rPr lang="en-US" smtClean="0"/>
-              <a:t>8/7/14</a:t>
+              <a:t>11/22/17</a:t>
             </a:fld>
             <a:endParaRPr lang="en-US"/>
           </a:p>
@@ -1982,7 +1998,7 @@
           <a:p>
             <a:fld id="{14627BBC-630D-C841-BF83-BB7F02310FA4}" type="datetimeFigureOut">
               <a:rPr lang="en-US" smtClean="0"/>
-              <a:t>8/7/14</a:t>
+              <a:t>11/22/17</a:t>
             </a:fld>
             <a:endParaRPr lang="en-US"/>
           </a:p>
@@ -2259,7 +2275,7 @@
           <a:p>
             <a:fld id="{14627BBC-630D-C841-BF83-BB7F02310FA4}" type="datetimeFigureOut">
               <a:rPr lang="en-US" smtClean="0"/>
-              <a:t>8/7/14</a:t>
+              <a:t>11/22/17</a:t>
             </a:fld>
             <a:endParaRPr lang="en-US"/>
           </a:p>
@@ -2512,7 +2528,7 @@
           <a:p>
             <a:fld id="{14627BBC-630D-C841-BF83-BB7F02310FA4}" type="datetimeFigureOut">
               <a:rPr lang="en-US" smtClean="0"/>
-              <a:t>8/7/14</a:t>
+              <a:t>11/22/17</a:t>
             </a:fld>
             <a:endParaRPr lang="en-US"/>
           </a:p>
@@ -2725,7 +2741,7 @@
           <a:p>
             <a:fld id="{14627BBC-630D-C841-BF83-BB7F02310FA4}" type="datetimeFigureOut">
               <a:rPr lang="en-US" smtClean="0"/>
-              <a:t>8/7/14</a:t>
+              <a:t>11/22/17</a:t>
             </a:fld>
             <a:endParaRPr lang="en-US"/>
           </a:p>
@@ -3263,17 +3279,7 @@
                   </a:schemeClr>
                 </a:solidFill>
               </a:rPr>
-              <a:t>Infrastructure </a:t>
-            </a:r>
-            <a:r>
-              <a:rPr lang="en-US" sz="1200" b="1" dirty="0" smtClean="0">
-                <a:solidFill>
-                  <a:schemeClr val="bg1">
-                    <a:lumMod val="95000"/>
-                  </a:schemeClr>
-                </a:solidFill>
-              </a:rPr>
-              <a:t>Services</a:t>
+              <a:t>Infrastructure Services</a:t>
             </a:r>
           </a:p>
           <a:p>
@@ -3529,7 +3535,7 @@
         </p:nvGrpSpPr>
         <p:grpSpPr bwMode="auto">
           <a:xfrm>
-            <a:off x="505771" y="151807"/>
+            <a:off x="516883" y="151807"/>
             <a:ext cx="4494213" cy="2141538"/>
             <a:chOff x="4649787" y="906191"/>
             <a:chExt cx="4494213" cy="2142649"/>
@@ -3753,7 +3759,7 @@
             <a:p>
               <a:pPr algn="ctr"/>
               <a:r>
-                <a:rPr lang="en-US" sz="1200" b="1" dirty="0" smtClean="0">
+                <a:rPr lang="en-US" sz="1200" b="1" smtClean="0">
                   <a:solidFill>
                     <a:schemeClr val="bg1">
                       <a:lumMod val="95000"/>
@@ -3763,47 +3769,14 @@
                 <a:t>Science </a:t>
               </a:r>
               <a:r>
-                <a:rPr lang="en-US" sz="1200" b="1" dirty="0">
+                <a:rPr lang="en-US" sz="1200" b="1" smtClean="0">
                   <a:solidFill>
                     <a:schemeClr val="bg1">
                       <a:lumMod val="95000"/>
                     </a:schemeClr>
                   </a:solidFill>
                 </a:rPr>
-                <a:t>User Interface</a:t>
-              </a:r>
-              <a:r>
-                <a:rPr lang="en-US" sz="1200" b="1" dirty="0" smtClean="0">
-                  <a:solidFill>
-                    <a:schemeClr val="bg1">
-                      <a:lumMod val="95000"/>
-                    </a:schemeClr>
-                  </a:solidFill>
-                </a:rPr>
-                <a:t> </a:t>
-              </a:r>
-            </a:p>
-            <a:p>
-              <a:pPr algn="ctr"/>
-              <a:r>
-                <a:rPr lang="en-US" sz="1200" b="1" dirty="0" smtClean="0">
-                  <a:solidFill>
-                    <a:schemeClr val="bg1">
-                      <a:lumMod val="95000"/>
-                    </a:schemeClr>
-                  </a:solidFill>
-                </a:rPr>
-                <a:t>and </a:t>
-              </a:r>
-              <a:r>
-                <a:rPr lang="en-US" sz="1200" b="1" dirty="0">
-                  <a:solidFill>
-                    <a:schemeClr val="bg1">
-                      <a:lumMod val="95000"/>
-                    </a:schemeClr>
-                  </a:solidFill>
-                </a:rPr>
-                <a:t>Analysis Tools</a:t>
+                <a:t>Platform</a:t>
               </a:r>
               <a:endParaRPr lang="en-US" sz="1600" dirty="0">
                 <a:solidFill>
@@ -3927,17 +3900,7 @@
                   </a:schemeClr>
                 </a:solidFill>
               </a:rPr>
-              <a:t>Level 3 </a:t>
-            </a:r>
-            <a:r>
-              <a:rPr lang="en-US" sz="1200" b="1" dirty="0" smtClean="0">
-                <a:solidFill>
-                  <a:schemeClr val="bg1">
-                    <a:lumMod val="95000"/>
-                  </a:schemeClr>
-                </a:solidFill>
-              </a:rPr>
-              <a:t>Toolkits</a:t>
+              <a:t>Level 3 Toolkits</a:t>
             </a:r>
             <a:endParaRPr lang="en-US" sz="1600" dirty="0">
               <a:solidFill>

</xml_diff>